<commit_message>
Deploy reposense/RepoSense to github.com/reposense/RepoSense.git:gh-pages
</commit_message>
<xml_diff>
--- a/diagrams/report-features.pptx
+++ b/diagrams/report-features.pptx
@@ -261,7 +261,7 @@
           <a:p>
             <a:fld id="{BC643CBC-B76F-46AA-8129-8C84DB44B84D}" type="datetimeFigureOut">
               <a:rPr lang="en-SG" smtClean="0"/>
-              <a:t>18/3/20</a:t>
+              <a:t>9/5/20</a:t>
             </a:fld>
             <a:endParaRPr lang="en-SG"/>
           </a:p>
@@ -461,7 +461,7 @@
           <a:p>
             <a:fld id="{BC643CBC-B76F-46AA-8129-8C84DB44B84D}" type="datetimeFigureOut">
               <a:rPr lang="en-SG" smtClean="0"/>
-              <a:t>18/3/20</a:t>
+              <a:t>9/5/20</a:t>
             </a:fld>
             <a:endParaRPr lang="en-SG"/>
           </a:p>
@@ -671,7 +671,7 @@
           <a:p>
             <a:fld id="{BC643CBC-B76F-46AA-8129-8C84DB44B84D}" type="datetimeFigureOut">
               <a:rPr lang="en-SG" smtClean="0"/>
-              <a:t>18/3/20</a:t>
+              <a:t>9/5/20</a:t>
             </a:fld>
             <a:endParaRPr lang="en-SG"/>
           </a:p>
@@ -871,7 +871,7 @@
           <a:p>
             <a:fld id="{BC643CBC-B76F-46AA-8129-8C84DB44B84D}" type="datetimeFigureOut">
               <a:rPr lang="en-SG" smtClean="0"/>
-              <a:t>18/3/20</a:t>
+              <a:t>9/5/20</a:t>
             </a:fld>
             <a:endParaRPr lang="en-SG"/>
           </a:p>
@@ -1147,7 +1147,7 @@
           <a:p>
             <a:fld id="{BC643CBC-B76F-46AA-8129-8C84DB44B84D}" type="datetimeFigureOut">
               <a:rPr lang="en-SG" smtClean="0"/>
-              <a:t>18/3/20</a:t>
+              <a:t>9/5/20</a:t>
             </a:fld>
             <a:endParaRPr lang="en-SG"/>
           </a:p>
@@ -1415,7 +1415,7 @@
           <a:p>
             <a:fld id="{BC643CBC-B76F-46AA-8129-8C84DB44B84D}" type="datetimeFigureOut">
               <a:rPr lang="en-SG" smtClean="0"/>
-              <a:t>18/3/20</a:t>
+              <a:t>9/5/20</a:t>
             </a:fld>
             <a:endParaRPr lang="en-SG"/>
           </a:p>
@@ -1830,7 +1830,7 @@
           <a:p>
             <a:fld id="{BC643CBC-B76F-46AA-8129-8C84DB44B84D}" type="datetimeFigureOut">
               <a:rPr lang="en-SG" smtClean="0"/>
-              <a:t>18/3/20</a:t>
+              <a:t>9/5/20</a:t>
             </a:fld>
             <a:endParaRPr lang="en-SG"/>
           </a:p>
@@ -1972,7 +1972,7 @@
           <a:p>
             <a:fld id="{BC643CBC-B76F-46AA-8129-8C84DB44B84D}" type="datetimeFigureOut">
               <a:rPr lang="en-SG" smtClean="0"/>
-              <a:t>18/3/20</a:t>
+              <a:t>9/5/20</a:t>
             </a:fld>
             <a:endParaRPr lang="en-SG"/>
           </a:p>
@@ -2085,7 +2085,7 @@
           <a:p>
             <a:fld id="{BC643CBC-B76F-46AA-8129-8C84DB44B84D}" type="datetimeFigureOut">
               <a:rPr lang="en-SG" smtClean="0"/>
-              <a:t>18/3/20</a:t>
+              <a:t>9/5/20</a:t>
             </a:fld>
             <a:endParaRPr lang="en-SG"/>
           </a:p>
@@ -2398,7 +2398,7 @@
           <a:p>
             <a:fld id="{BC643CBC-B76F-46AA-8129-8C84DB44B84D}" type="datetimeFigureOut">
               <a:rPr lang="en-SG" smtClean="0"/>
-              <a:t>18/3/20</a:t>
+              <a:t>9/5/20</a:t>
             </a:fld>
             <a:endParaRPr lang="en-SG"/>
           </a:p>
@@ -2687,7 +2687,7 @@
           <a:p>
             <a:fld id="{BC643CBC-B76F-46AA-8129-8C84DB44B84D}" type="datetimeFigureOut">
               <a:rPr lang="en-SG" smtClean="0"/>
-              <a:t>18/3/20</a:t>
+              <a:t>9/5/20</a:t>
             </a:fld>
             <a:endParaRPr lang="en-SG"/>
           </a:p>
@@ -2930,7 +2930,7 @@
           <a:p>
             <a:fld id="{BC643CBC-B76F-46AA-8129-8C84DB44B84D}" type="datetimeFigureOut">
               <a:rPr lang="en-SG" smtClean="0"/>
-              <a:t>18/3/20</a:t>
+              <a:t>9/5/20</a:t>
             </a:fld>
             <a:endParaRPr lang="en-SG"/>
           </a:p>
@@ -3357,7 +3357,7 @@
       </p:grpSpPr>
       <p:pic>
         <p:nvPicPr>
-          <p:cNvPr id="5" name="Picture 4" descr="A screenshot of a social media post&#10;&#10;Description automatically generated">
+          <p:cNvPr id="5" name="Picture 4">
             <a:extLst>
               <a:ext uri="{FF2B5EF4-FFF2-40B4-BE49-F238E27FC236}">
                 <a16:creationId xmlns:a16="http://schemas.microsoft.com/office/drawing/2014/main" id="{B4E5294F-444B-4447-B9AA-FA88D06B7743}"/>
@@ -3377,14 +3377,13 @@
               </a:ext>
             </a:extLst>
           </a:blip>
-          <a:stretch>
-            <a:fillRect/>
-          </a:stretch>
+          <a:srcRect/>
+          <a:stretch/>
         </p:blipFill>
         <p:spPr>
           <a:xfrm>
-            <a:off x="1187572" y="643466"/>
-            <a:ext cx="9813566" cy="5569200"/>
+            <a:off x="1187572" y="665843"/>
+            <a:ext cx="9813566" cy="5524446"/>
           </a:xfrm>
           <a:prstGeom prst="rect">
             <a:avLst/>
@@ -3405,10 +3404,10 @@
         </p:nvGrpSpPr>
         <p:grpSpPr>
           <a:xfrm>
-            <a:off x="3604583" y="5552602"/>
-            <a:ext cx="1019826" cy="623120"/>
-            <a:chOff x="3946269" y="5051399"/>
-            <a:chExt cx="1019826" cy="623120"/>
+            <a:off x="3176752" y="5197952"/>
+            <a:ext cx="1019826" cy="585020"/>
+            <a:chOff x="3946269" y="5089499"/>
+            <a:chExt cx="1019826" cy="585020"/>
           </a:xfrm>
         </p:grpSpPr>
         <p:sp>
@@ -3425,7 +3424,7 @@
           </p:nvSpPr>
           <p:spPr>
             <a:xfrm>
-              <a:off x="3946269" y="5051399"/>
+              <a:off x="3946269" y="5089499"/>
               <a:ext cx="1019826" cy="276999"/>
             </a:xfrm>
             <a:prstGeom prst="rect">
@@ -3524,7 +3523,7 @@
         </p:nvGrpSpPr>
         <p:grpSpPr>
           <a:xfrm>
-            <a:off x="3048219" y="3723003"/>
+            <a:off x="3551139" y="3048633"/>
             <a:ext cx="1695743" cy="246221"/>
             <a:chOff x="2464522" y="2361561"/>
             <a:chExt cx="1695743" cy="246221"/>
@@ -3689,10 +3688,10 @@
         </p:nvGrpSpPr>
         <p:grpSpPr>
           <a:xfrm>
-            <a:off x="2942352" y="4322650"/>
-            <a:ext cx="1672681" cy="291016"/>
+            <a:off x="2953782" y="4551257"/>
+            <a:ext cx="1913291" cy="254087"/>
             <a:chOff x="2945234" y="3682075"/>
-            <a:chExt cx="1672681" cy="246221"/>
+            <a:chExt cx="1913291" cy="214976"/>
           </a:xfrm>
         </p:grpSpPr>
         <p:sp>
@@ -3810,7 +3809,7 @@
           <p:spPr>
             <a:xfrm>
               <a:off x="3217740" y="3682075"/>
-              <a:ext cx="1400175" cy="246221"/>
+              <a:ext cx="1640785" cy="208321"/>
             </a:xfrm>
             <a:prstGeom prst="rect">
               <a:avLst/>
@@ -3854,10 +3853,10 @@
         </p:nvGrpSpPr>
         <p:grpSpPr>
           <a:xfrm>
-            <a:off x="2753264" y="3023089"/>
-            <a:ext cx="2165611" cy="263574"/>
+            <a:off x="2913284" y="3205969"/>
+            <a:ext cx="2606672" cy="263574"/>
             <a:chOff x="2230032" y="2870443"/>
-            <a:chExt cx="2165611" cy="263574"/>
+            <a:chExt cx="2606672" cy="263574"/>
           </a:xfrm>
         </p:grpSpPr>
         <p:sp>
@@ -3984,7 +3983,7 @@
           <p:spPr>
             <a:xfrm>
               <a:off x="2493500" y="2870443"/>
-              <a:ext cx="1902143" cy="246221"/>
+              <a:ext cx="2343204" cy="246221"/>
             </a:xfrm>
             <a:prstGeom prst="rect">
               <a:avLst/>
@@ -4016,10 +4015,10 @@
       </p:grpSp>
       <p:grpSp>
         <p:nvGrpSpPr>
-          <p:cNvPr id="22" name="Group 21">
-            <a:extLst>
-              <a:ext uri="{FF2B5EF4-FFF2-40B4-BE49-F238E27FC236}">
-                <a16:creationId xmlns:a16="http://schemas.microsoft.com/office/drawing/2014/main" id="{25A622BC-A5B7-A44A-9C42-676F5FE8C9F9}"/>
+          <p:cNvPr id="26" name="Group 25">
+            <a:extLst>
+              <a:ext uri="{FF2B5EF4-FFF2-40B4-BE49-F238E27FC236}">
+                <a16:creationId xmlns:a16="http://schemas.microsoft.com/office/drawing/2014/main" id="{DEF0A00E-6934-F848-A76D-E0C0910D196B}"/>
               </a:ext>
             </a:extLst>
           </p:cNvPr>
@@ -4028,119 +4027,7 @@
         </p:nvGrpSpPr>
         <p:grpSpPr>
           <a:xfrm>
-            <a:off x="118577" y="4640643"/>
-            <a:ext cx="5959559" cy="461665"/>
-            <a:chOff x="731728" y="3629956"/>
-            <a:chExt cx="5399128" cy="461665"/>
-          </a:xfrm>
-        </p:grpSpPr>
-        <p:sp>
-          <p:nvSpPr>
-            <p:cNvPr id="23" name="Rectangle 22">
-              <a:extLst>
-                <a:ext uri="{FF2B5EF4-FFF2-40B4-BE49-F238E27FC236}">
-                  <a16:creationId xmlns:a16="http://schemas.microsoft.com/office/drawing/2014/main" id="{B564F8AB-86E1-AE47-8AEE-A391EE3A595A}"/>
-                </a:ext>
-              </a:extLst>
-            </p:cNvPr>
-            <p:cNvSpPr/>
-            <p:nvPr/>
-          </p:nvSpPr>
-          <p:spPr>
-            <a:xfrm>
-              <a:off x="1803254" y="3860789"/>
-              <a:ext cx="4327602" cy="119555"/>
-            </a:xfrm>
-            <a:prstGeom prst="rect">
-              <a:avLst/>
-            </a:prstGeom>
-            <a:noFill/>
-            <a:ln w="9525" cap="flat" cmpd="sng" algn="ctr">
-              <a:solidFill>
-                <a:schemeClr val="dk1"/>
-              </a:solidFill>
-              <a:prstDash val="solid"/>
-              <a:round/>
-              <a:headEnd type="none" w="med" len="med"/>
-              <a:tailEnd type="none" w="med" len="med"/>
-            </a:ln>
-          </p:spPr>
-          <p:style>
-            <a:lnRef idx="0">
-              <a:scrgbClr r="0" g="0" b="0"/>
-            </a:lnRef>
-            <a:fillRef idx="0">
-              <a:scrgbClr r="0" g="0" b="0"/>
-            </a:fillRef>
-            <a:effectRef idx="0">
-              <a:scrgbClr r="0" g="0" b="0"/>
-            </a:effectRef>
-            <a:fontRef idx="minor">
-              <a:schemeClr val="dk1"/>
-            </a:fontRef>
-          </p:style>
-          <p:txBody>
-            <a:bodyPr rtlCol="0" anchor="ctr"/>
-            <a:lstStyle/>
-            <a:p>
-              <a:pPr algn="ctr"/>
-              <a:endParaRPr lang="en-SG"/>
-            </a:p>
-          </p:txBody>
-        </p:sp>
-        <p:sp>
-          <p:nvSpPr>
-            <p:cNvPr id="25" name="TextBox 24">
-              <a:extLst>
-                <a:ext uri="{FF2B5EF4-FFF2-40B4-BE49-F238E27FC236}">
-                  <a16:creationId xmlns:a16="http://schemas.microsoft.com/office/drawing/2014/main" id="{C8343F1E-8844-E749-B305-01B53FD52B56}"/>
-                </a:ext>
-              </a:extLst>
-            </p:cNvPr>
-            <p:cNvSpPr txBox="1"/>
-            <p:nvPr/>
-          </p:nvSpPr>
-          <p:spPr>
-            <a:xfrm>
-              <a:off x="731728" y="3629956"/>
-              <a:ext cx="1014711" cy="461665"/>
-            </a:xfrm>
-            <a:prstGeom prst="rect">
-              <a:avLst/>
-            </a:prstGeom>
-            <a:noFill/>
-          </p:spPr>
-          <p:txBody>
-            <a:bodyPr wrap="square" rtlCol="0">
-              <a:spAutoFit/>
-            </a:bodyPr>
-            <a:lstStyle/>
-            <a:p>
-              <a:pPr algn="ctr"/>
-              <a:r>
-                <a:rPr lang="en-US" sz="1200" dirty="0"/>
-                <a:t>Contribution Bar</a:t>
-              </a:r>
-              <a:endParaRPr lang="en-SG" sz="1200" dirty="0"/>
-            </a:p>
-          </p:txBody>
-        </p:sp>
-      </p:grpSp>
-      <p:grpSp>
-        <p:nvGrpSpPr>
-          <p:cNvPr id="26" name="Group 25">
-            <a:extLst>
-              <a:ext uri="{FF2B5EF4-FFF2-40B4-BE49-F238E27FC236}">
-                <a16:creationId xmlns:a16="http://schemas.microsoft.com/office/drawing/2014/main" id="{DEF0A00E-6934-F848-A76D-E0C0910D196B}"/>
-              </a:ext>
-            </a:extLst>
-          </p:cNvPr>
-          <p:cNvGrpSpPr/>
-          <p:nvPr/>
-        </p:nvGrpSpPr>
-        <p:grpSpPr>
-          <a:xfrm>
-            <a:off x="189682" y="3246565"/>
+            <a:off x="189682" y="3429445"/>
             <a:ext cx="5752649" cy="530943"/>
             <a:chOff x="778195" y="2021953"/>
             <a:chExt cx="5209217" cy="461665"/>
@@ -4307,7 +4194,7 @@
         </p:nvGrpSpPr>
         <p:grpSpPr>
           <a:xfrm>
-            <a:off x="6509832" y="1982345"/>
+            <a:off x="6509832" y="2029970"/>
             <a:ext cx="3424155" cy="402234"/>
             <a:chOff x="6202680" y="1735827"/>
             <a:chExt cx="3424155" cy="402234"/>
@@ -4476,7 +4363,7 @@
         </p:nvGrpSpPr>
         <p:grpSpPr>
           <a:xfrm>
-            <a:off x="9567334" y="3299134"/>
+            <a:off x="9414934" y="4232584"/>
             <a:ext cx="1139315" cy="562172"/>
             <a:chOff x="8559185" y="2719565"/>
             <a:chExt cx="1139315" cy="562172"/>
@@ -4641,7 +4528,7 @@
         </p:nvGrpSpPr>
         <p:grpSpPr>
           <a:xfrm>
-            <a:off x="8358978" y="2895216"/>
+            <a:off x="8206578" y="3800091"/>
             <a:ext cx="1252259" cy="404424"/>
             <a:chOff x="7350829" y="3118022"/>
             <a:chExt cx="1252259" cy="404424"/>
@@ -5104,52 +4991,185 @@
           </p:txBody>
         </p:sp>
       </p:grpSp>
-      <p:sp>
-        <p:nvSpPr>
-          <p:cNvPr id="54" name="Arrow: Left 47">
-            <a:extLst>
-              <a:ext uri="{FF2B5EF4-FFF2-40B4-BE49-F238E27FC236}">
-                <a16:creationId xmlns:a16="http://schemas.microsoft.com/office/drawing/2014/main" id="{D08A5AA5-5E30-1B44-B88A-D53EE29DB3F4}"/>
-              </a:ext>
-            </a:extLst>
-          </p:cNvPr>
-          <p:cNvSpPr/>
+      <p:grpSp>
+        <p:nvGrpSpPr>
+          <p:cNvPr id="2" name="Group 1">
+            <a:extLst>
+              <a:ext uri="{FF2B5EF4-FFF2-40B4-BE49-F238E27FC236}">
+                <a16:creationId xmlns:a16="http://schemas.microsoft.com/office/drawing/2014/main" id="{FC32F964-DDAA-8C41-A0F8-5E30AECAEB34}"/>
+              </a:ext>
+            </a:extLst>
+          </p:cNvPr>
+          <p:cNvGrpSpPr/>
           <p:nvPr/>
-        </p:nvSpPr>
-        <p:spPr>
+        </p:nvGrpSpPr>
+        <p:grpSpPr>
           <a:xfrm>
-            <a:off x="969529" y="4892392"/>
-            <a:ext cx="250504" cy="77721"/>
+            <a:off x="118577" y="4869243"/>
+            <a:ext cx="5959559" cy="461665"/>
+            <a:chOff x="118577" y="4640643"/>
+            <a:chExt cx="5959559" cy="461665"/>
           </a:xfrm>
-          <a:prstGeom prst="leftArrow">
-            <a:avLst/>
-          </a:prstGeom>
-        </p:spPr>
-        <p:style>
-          <a:lnRef idx="2">
-            <a:schemeClr val="dk1">
-              <a:shade val="50000"/>
-            </a:schemeClr>
-          </a:lnRef>
-          <a:fillRef idx="1">
-            <a:schemeClr val="dk1"/>
-          </a:fillRef>
-          <a:effectRef idx="0">
-            <a:schemeClr val="dk1"/>
-          </a:effectRef>
-          <a:fontRef idx="minor">
-            <a:schemeClr val="lt1"/>
-          </a:fontRef>
-        </p:style>
-        <p:txBody>
-          <a:bodyPr rtlCol="0" anchor="ctr"/>
-          <a:lstStyle/>
-          <a:p>
-            <a:pPr algn="ctr"/>
-            <a:endParaRPr lang="en-SG"/>
-          </a:p>
-        </p:txBody>
-      </p:sp>
+        </p:grpSpPr>
+        <p:grpSp>
+          <p:nvGrpSpPr>
+            <p:cNvPr id="22" name="Group 21">
+              <a:extLst>
+                <a:ext uri="{FF2B5EF4-FFF2-40B4-BE49-F238E27FC236}">
+                  <a16:creationId xmlns:a16="http://schemas.microsoft.com/office/drawing/2014/main" id="{25A622BC-A5B7-A44A-9C42-676F5FE8C9F9}"/>
+                </a:ext>
+              </a:extLst>
+            </p:cNvPr>
+            <p:cNvGrpSpPr/>
+            <p:nvPr/>
+          </p:nvGrpSpPr>
+          <p:grpSpPr>
+            <a:xfrm>
+              <a:off x="118577" y="4640643"/>
+              <a:ext cx="5959559" cy="461665"/>
+              <a:chOff x="731728" y="3629956"/>
+              <a:chExt cx="5399128" cy="461665"/>
+            </a:xfrm>
+          </p:grpSpPr>
+          <p:sp>
+            <p:nvSpPr>
+              <p:cNvPr id="23" name="Rectangle 22">
+                <a:extLst>
+                  <a:ext uri="{FF2B5EF4-FFF2-40B4-BE49-F238E27FC236}">
+                    <a16:creationId xmlns:a16="http://schemas.microsoft.com/office/drawing/2014/main" id="{B564F8AB-86E1-AE47-8AEE-A391EE3A595A}"/>
+                  </a:ext>
+                </a:extLst>
+              </p:cNvPr>
+              <p:cNvSpPr/>
+              <p:nvPr/>
+            </p:nvSpPr>
+            <p:spPr>
+              <a:xfrm>
+                <a:off x="1803254" y="3860789"/>
+                <a:ext cx="4327602" cy="119555"/>
+              </a:xfrm>
+              <a:prstGeom prst="rect">
+                <a:avLst/>
+              </a:prstGeom>
+              <a:noFill/>
+              <a:ln w="9525" cap="flat" cmpd="sng" algn="ctr">
+                <a:solidFill>
+                  <a:schemeClr val="dk1"/>
+                </a:solidFill>
+                <a:prstDash val="solid"/>
+                <a:round/>
+                <a:headEnd type="none" w="med" len="med"/>
+                <a:tailEnd type="none" w="med" len="med"/>
+              </a:ln>
+            </p:spPr>
+            <p:style>
+              <a:lnRef idx="0">
+                <a:scrgbClr r="0" g="0" b="0"/>
+              </a:lnRef>
+              <a:fillRef idx="0">
+                <a:scrgbClr r="0" g="0" b="0"/>
+              </a:fillRef>
+              <a:effectRef idx="0">
+                <a:scrgbClr r="0" g="0" b="0"/>
+              </a:effectRef>
+              <a:fontRef idx="minor">
+                <a:schemeClr val="dk1"/>
+              </a:fontRef>
+            </p:style>
+            <p:txBody>
+              <a:bodyPr rtlCol="0" anchor="ctr"/>
+              <a:lstStyle/>
+              <a:p>
+                <a:pPr algn="ctr"/>
+                <a:endParaRPr lang="en-SG"/>
+              </a:p>
+            </p:txBody>
+          </p:sp>
+          <p:sp>
+            <p:nvSpPr>
+              <p:cNvPr id="25" name="TextBox 24">
+                <a:extLst>
+                  <a:ext uri="{FF2B5EF4-FFF2-40B4-BE49-F238E27FC236}">
+                    <a16:creationId xmlns:a16="http://schemas.microsoft.com/office/drawing/2014/main" id="{C8343F1E-8844-E749-B305-01B53FD52B56}"/>
+                  </a:ext>
+                </a:extLst>
+              </p:cNvPr>
+              <p:cNvSpPr txBox="1"/>
+              <p:nvPr/>
+            </p:nvSpPr>
+            <p:spPr>
+              <a:xfrm>
+                <a:off x="731728" y="3629956"/>
+                <a:ext cx="1014711" cy="461665"/>
+              </a:xfrm>
+              <a:prstGeom prst="rect">
+                <a:avLst/>
+              </a:prstGeom>
+              <a:noFill/>
+            </p:spPr>
+            <p:txBody>
+              <a:bodyPr wrap="square" rtlCol="0">
+                <a:spAutoFit/>
+              </a:bodyPr>
+              <a:lstStyle/>
+              <a:p>
+                <a:pPr algn="ctr"/>
+                <a:r>
+                  <a:rPr lang="en-US" sz="1200" dirty="0"/>
+                  <a:t>Contribution Bar</a:t>
+                </a:r>
+                <a:endParaRPr lang="en-SG" sz="1200" dirty="0"/>
+              </a:p>
+            </p:txBody>
+          </p:sp>
+        </p:grpSp>
+        <p:sp>
+          <p:nvSpPr>
+            <p:cNvPr id="54" name="Arrow: Left 47">
+              <a:extLst>
+                <a:ext uri="{FF2B5EF4-FFF2-40B4-BE49-F238E27FC236}">
+                  <a16:creationId xmlns:a16="http://schemas.microsoft.com/office/drawing/2014/main" id="{D08A5AA5-5E30-1B44-B88A-D53EE29DB3F4}"/>
+                </a:ext>
+              </a:extLst>
+            </p:cNvPr>
+            <p:cNvSpPr/>
+            <p:nvPr/>
+          </p:nvSpPr>
+          <p:spPr>
+            <a:xfrm>
+              <a:off x="969529" y="4892392"/>
+              <a:ext cx="250504" cy="77721"/>
+            </a:xfrm>
+            <a:prstGeom prst="leftArrow">
+              <a:avLst/>
+            </a:prstGeom>
+          </p:spPr>
+          <p:style>
+            <a:lnRef idx="2">
+              <a:schemeClr val="dk1">
+                <a:shade val="50000"/>
+              </a:schemeClr>
+            </a:lnRef>
+            <a:fillRef idx="1">
+              <a:schemeClr val="dk1"/>
+            </a:fillRef>
+            <a:effectRef idx="0">
+              <a:schemeClr val="dk1"/>
+            </a:effectRef>
+            <a:fontRef idx="minor">
+              <a:schemeClr val="lt1"/>
+            </a:fontRef>
+          </p:style>
+          <p:txBody>
+            <a:bodyPr rtlCol="0" anchor="ctr"/>
+            <a:lstStyle/>
+            <a:p>
+              <a:pPr algn="ctr"/>
+              <a:endParaRPr lang="en-SG"/>
+            </a:p>
+          </p:txBody>
+        </p:sp>
+      </p:grpSp>
       <p:grpSp>
         <p:nvGrpSpPr>
           <p:cNvPr id="55" name="Group 54">
@@ -5165,9 +5185,9 @@
         <p:grpSpPr>
           <a:xfrm>
             <a:off x="140442" y="793236"/>
-            <a:ext cx="5801889" cy="869031"/>
+            <a:ext cx="5801889" cy="1148907"/>
             <a:chOff x="315534" y="945868"/>
-            <a:chExt cx="5164879" cy="869031"/>
+            <a:chExt cx="5164879" cy="1148907"/>
           </a:xfrm>
         </p:grpSpPr>
         <p:sp>
@@ -5185,7 +5205,7 @@
           <p:spPr>
             <a:xfrm>
               <a:off x="919101" y="945868"/>
-              <a:ext cx="513688" cy="869029"/>
+              <a:ext cx="513688" cy="1148905"/>
             </a:xfrm>
             <a:prstGeom prst="leftBrace">
               <a:avLst>
@@ -5231,7 +5251,7 @@
           </p:nvSpPr>
           <p:spPr>
             <a:xfrm>
-              <a:off x="315534" y="1241882"/>
+              <a:off x="315534" y="1367612"/>
               <a:ext cx="723900" cy="276999"/>
             </a:xfrm>
             <a:prstGeom prst="rect">
@@ -5272,7 +5292,7 @@
           <p:spPr>
             <a:xfrm>
               <a:off x="1432790" y="945870"/>
-              <a:ext cx="4047623" cy="869029"/>
+              <a:ext cx="4047623" cy="1148905"/>
             </a:xfrm>
             <a:prstGeom prst="rect">
               <a:avLst/>
@@ -5312,6 +5332,427 @@
           </p:txBody>
         </p:sp>
       </p:grpSp>
+      <p:grpSp>
+        <p:nvGrpSpPr>
+          <p:cNvPr id="51" name="Group 50">
+            <a:extLst>
+              <a:ext uri="{FF2B5EF4-FFF2-40B4-BE49-F238E27FC236}">
+                <a16:creationId xmlns:a16="http://schemas.microsoft.com/office/drawing/2014/main" id="{9138041B-F15F-2944-BDDF-59C7EF162B12}"/>
+              </a:ext>
+            </a:extLst>
+          </p:cNvPr>
+          <p:cNvGrpSpPr/>
+          <p:nvPr/>
+        </p:nvGrpSpPr>
+        <p:grpSpPr>
+          <a:xfrm>
+            <a:off x="2882804" y="3872719"/>
+            <a:ext cx="2279911" cy="263574"/>
+            <a:chOff x="2230032" y="2870443"/>
+            <a:chExt cx="2279911" cy="263574"/>
+          </a:xfrm>
+        </p:grpSpPr>
+        <p:sp>
+          <p:nvSpPr>
+            <p:cNvPr id="52" name="Oval 51">
+              <a:extLst>
+                <a:ext uri="{FF2B5EF4-FFF2-40B4-BE49-F238E27FC236}">
+                  <a16:creationId xmlns:a16="http://schemas.microsoft.com/office/drawing/2014/main" id="{8C3DBB80-9D9A-114D-89A6-F5971AE0A38F}"/>
+                </a:ext>
+              </a:extLst>
+            </p:cNvPr>
+            <p:cNvSpPr/>
+            <p:nvPr/>
+          </p:nvSpPr>
+          <p:spPr>
+            <a:xfrm>
+              <a:off x="2230032" y="3000667"/>
+              <a:ext cx="130499" cy="133350"/>
+            </a:xfrm>
+            <a:prstGeom prst="ellipse">
+              <a:avLst/>
+            </a:prstGeom>
+            <a:noFill/>
+            <a:ln w="9525" cap="flat" cmpd="sng" algn="ctr">
+              <a:solidFill>
+                <a:schemeClr val="accent4">
+                  <a:lumMod val="75000"/>
+                </a:schemeClr>
+              </a:solidFill>
+              <a:prstDash val="solid"/>
+              <a:round/>
+              <a:headEnd type="none" w="med" len="med"/>
+              <a:tailEnd type="none" w="med" len="med"/>
+            </a:ln>
+          </p:spPr>
+          <p:style>
+            <a:lnRef idx="0">
+              <a:scrgbClr r="0" g="0" b="0"/>
+            </a:lnRef>
+            <a:fillRef idx="0">
+              <a:scrgbClr r="0" g="0" b="0"/>
+            </a:fillRef>
+            <a:effectRef idx="0">
+              <a:scrgbClr r="0" g="0" b="0"/>
+            </a:effectRef>
+            <a:fontRef idx="minor">
+              <a:schemeClr val="accent6"/>
+            </a:fontRef>
+          </p:style>
+          <p:txBody>
+            <a:bodyPr rtlCol="0" anchor="ctr"/>
+            <a:lstStyle/>
+            <a:p>
+              <a:pPr algn="ctr"/>
+              <a:endParaRPr lang="en-SG"/>
+            </a:p>
+          </p:txBody>
+        </p:sp>
+        <p:sp>
+          <p:nvSpPr>
+            <p:cNvPr id="53" name="Arrow: Bent 29">
+              <a:extLst>
+                <a:ext uri="{FF2B5EF4-FFF2-40B4-BE49-F238E27FC236}">
+                  <a16:creationId xmlns:a16="http://schemas.microsoft.com/office/drawing/2014/main" id="{33158B85-34BF-8042-8B94-5B4B20553CC5}"/>
+                </a:ext>
+              </a:extLst>
+            </p:cNvPr>
+            <p:cNvSpPr/>
+            <p:nvPr/>
+          </p:nvSpPr>
+          <p:spPr>
+            <a:xfrm>
+              <a:off x="2281147" y="2943386"/>
+              <a:ext cx="381984" cy="57282"/>
+            </a:xfrm>
+            <a:prstGeom prst="bentArrow">
+              <a:avLst>
+                <a:gd name="adj1" fmla="val 25000"/>
+                <a:gd name="adj2" fmla="val 26516"/>
+                <a:gd name="adj3" fmla="val 25000"/>
+                <a:gd name="adj4" fmla="val 43750"/>
+              </a:avLst>
+            </a:prstGeom>
+            <a:solidFill>
+              <a:schemeClr val="accent4">
+                <a:lumMod val="75000"/>
+              </a:schemeClr>
+            </a:solidFill>
+            <a:ln>
+              <a:solidFill>
+                <a:schemeClr val="accent4">
+                  <a:lumMod val="50000"/>
+                </a:schemeClr>
+              </a:solidFill>
+            </a:ln>
+          </p:spPr>
+          <p:style>
+            <a:lnRef idx="2">
+              <a:schemeClr val="accent6">
+                <a:shade val="50000"/>
+              </a:schemeClr>
+            </a:lnRef>
+            <a:fillRef idx="1">
+              <a:schemeClr val="accent6"/>
+            </a:fillRef>
+            <a:effectRef idx="0">
+              <a:schemeClr val="accent6"/>
+            </a:effectRef>
+            <a:fontRef idx="minor">
+              <a:schemeClr val="lt1"/>
+            </a:fontRef>
+          </p:style>
+          <p:txBody>
+            <a:bodyPr rtlCol="0" anchor="ctr"/>
+            <a:lstStyle/>
+            <a:p>
+              <a:pPr algn="ctr"/>
+              <a:endParaRPr lang="en-SG">
+                <a:solidFill>
+                  <a:schemeClr val="tx1"/>
+                </a:solidFill>
+              </a:endParaRPr>
+            </a:p>
+          </p:txBody>
+        </p:sp>
+        <p:sp>
+          <p:nvSpPr>
+            <p:cNvPr id="59" name="TextBox 58">
+              <a:extLst>
+                <a:ext uri="{FF2B5EF4-FFF2-40B4-BE49-F238E27FC236}">
+                  <a16:creationId xmlns:a16="http://schemas.microsoft.com/office/drawing/2014/main" id="{C6BC47DB-37BE-7440-9DD6-3E79F8B4F00C}"/>
+                </a:ext>
+              </a:extLst>
+            </p:cNvPr>
+            <p:cNvSpPr txBox="1"/>
+            <p:nvPr/>
+          </p:nvSpPr>
+          <p:spPr>
+            <a:xfrm>
+              <a:off x="2607800" y="2870443"/>
+              <a:ext cx="1902143" cy="246221"/>
+            </a:xfrm>
+            <a:prstGeom prst="rect">
+              <a:avLst/>
+            </a:prstGeom>
+            <a:noFill/>
+          </p:spPr>
+          <p:txBody>
+            <a:bodyPr wrap="square" rtlCol="0">
+              <a:spAutoFit/>
+            </a:bodyPr>
+            <a:lstStyle/>
+            <a:p>
+              <a:r>
+                <a:rPr lang="en-US" altLang="zh-CN" sz="1000" dirty="0">
+                  <a:solidFill>
+                    <a:schemeClr val="accent4">
+                      <a:lumMod val="75000"/>
+                    </a:schemeClr>
+                  </a:solidFill>
+                </a:rPr>
+                <a:t>Link</a:t>
+              </a:r>
+              <a:r>
+                <a:rPr lang="zh-CN" altLang="en-US" sz="1000" dirty="0">
+                  <a:solidFill>
+                    <a:schemeClr val="accent4">
+                      <a:lumMod val="75000"/>
+                    </a:schemeClr>
+                  </a:solidFill>
+                </a:rPr>
+                <a:t> </a:t>
+              </a:r>
+              <a:r>
+                <a:rPr lang="en-US" altLang="zh-CN" sz="1000" dirty="0">
+                  <a:solidFill>
+                    <a:schemeClr val="accent4">
+                      <a:lumMod val="75000"/>
+                    </a:schemeClr>
+                  </a:solidFill>
+                </a:rPr>
+                <a:t>to</a:t>
+              </a:r>
+              <a:r>
+                <a:rPr lang="zh-CN" altLang="en-US" sz="1000" dirty="0">
+                  <a:solidFill>
+                    <a:schemeClr val="accent4">
+                      <a:lumMod val="75000"/>
+                    </a:schemeClr>
+                  </a:solidFill>
+                </a:rPr>
+                <a:t> </a:t>
+              </a:r>
+              <a:r>
+                <a:rPr lang="en-US" altLang="zh-CN" sz="1000" dirty="0">
+                  <a:solidFill>
+                    <a:schemeClr val="accent4">
+                      <a:lumMod val="75000"/>
+                    </a:schemeClr>
+                  </a:solidFill>
+                </a:rPr>
+                <a:t>author’s</a:t>
+              </a:r>
+              <a:r>
+                <a:rPr lang="zh-CN" altLang="en-US" sz="1000" dirty="0">
+                  <a:solidFill>
+                    <a:schemeClr val="accent4">
+                      <a:lumMod val="75000"/>
+                    </a:schemeClr>
+                  </a:solidFill>
+                </a:rPr>
+                <a:t> </a:t>
+              </a:r>
+              <a:r>
+                <a:rPr lang="en-US" altLang="zh-CN" sz="1000" dirty="0">
+                  <a:solidFill>
+                    <a:schemeClr val="accent4">
+                      <a:lumMod val="75000"/>
+                    </a:schemeClr>
+                  </a:solidFill>
+                </a:rPr>
+                <a:t>page</a:t>
+              </a:r>
+              <a:endParaRPr lang="en-SG" sz="1000" dirty="0">
+                <a:solidFill>
+                  <a:schemeClr val="accent4">
+                    <a:lumMod val="75000"/>
+                  </a:schemeClr>
+                </a:solidFill>
+              </a:endParaRPr>
+            </a:p>
+          </p:txBody>
+        </p:sp>
+      </p:grpSp>
+      <p:sp>
+        <p:nvSpPr>
+          <p:cNvPr id="60" name="Oval 59">
+            <a:extLst>
+              <a:ext uri="{FF2B5EF4-FFF2-40B4-BE49-F238E27FC236}">
+                <a16:creationId xmlns:a16="http://schemas.microsoft.com/office/drawing/2014/main" id="{83841894-E3CA-EB43-8F34-D5E1B9E4D403}"/>
+              </a:ext>
+            </a:extLst>
+          </p:cNvPr>
+          <p:cNvSpPr/>
+          <p:nvPr/>
+        </p:nvSpPr>
+        <p:spPr>
+          <a:xfrm>
+            <a:off x="3405955" y="3138233"/>
+            <a:ext cx="147081" cy="143858"/>
+          </a:xfrm>
+          <a:prstGeom prst="ellipse">
+            <a:avLst/>
+          </a:prstGeom>
+          <a:noFill/>
+          <a:ln w="9525" cap="flat" cmpd="sng" algn="ctr">
+            <a:solidFill>
+              <a:schemeClr val="accent1"/>
+            </a:solidFill>
+            <a:prstDash val="solid"/>
+            <a:round/>
+            <a:headEnd type="none" w="med" len="med"/>
+            <a:tailEnd type="none" w="med" len="med"/>
+          </a:ln>
+        </p:spPr>
+        <p:style>
+          <a:lnRef idx="0">
+            <a:scrgbClr r="0" g="0" b="0"/>
+          </a:lnRef>
+          <a:fillRef idx="0">
+            <a:scrgbClr r="0" g="0" b="0"/>
+          </a:fillRef>
+          <a:effectRef idx="0">
+            <a:scrgbClr r="0" g="0" b="0"/>
+          </a:effectRef>
+          <a:fontRef idx="minor">
+            <a:schemeClr val="accent1"/>
+          </a:fontRef>
+        </p:style>
+        <p:txBody>
+          <a:bodyPr rtlCol="0" anchor="ctr"/>
+          <a:lstStyle/>
+          <a:p>
+            <a:pPr algn="ctr"/>
+            <a:endParaRPr lang="en-SG"/>
+          </a:p>
+        </p:txBody>
+      </p:sp>
+      <p:sp>
+        <p:nvSpPr>
+          <p:cNvPr id="61" name="Arrow: Right 26">
+            <a:extLst>
+              <a:ext uri="{FF2B5EF4-FFF2-40B4-BE49-F238E27FC236}">
+                <a16:creationId xmlns:a16="http://schemas.microsoft.com/office/drawing/2014/main" id="{2FEE036E-9ED7-0446-BEDE-DB6E04BF8324}"/>
+              </a:ext>
+            </a:extLst>
+          </p:cNvPr>
+          <p:cNvSpPr/>
+          <p:nvPr/>
+        </p:nvSpPr>
+        <p:spPr>
+          <a:xfrm rot="12225628">
+            <a:off x="3242639" y="3093964"/>
+            <a:ext cx="142378" cy="66676"/>
+          </a:xfrm>
+          <a:prstGeom prst="rightArrow">
+            <a:avLst/>
+          </a:prstGeom>
+          <a:solidFill>
+            <a:schemeClr val="accent1"/>
+          </a:solidFill>
+          <a:ln>
+            <a:solidFill>
+              <a:srgbClr val="002060"/>
+            </a:solidFill>
+          </a:ln>
+        </p:spPr>
+        <p:style>
+          <a:lnRef idx="2">
+            <a:schemeClr val="accent2">
+              <a:shade val="50000"/>
+            </a:schemeClr>
+          </a:lnRef>
+          <a:fillRef idx="1">
+            <a:schemeClr val="accent2"/>
+          </a:fillRef>
+          <a:effectRef idx="0">
+            <a:schemeClr val="accent2"/>
+          </a:effectRef>
+          <a:fontRef idx="minor">
+            <a:schemeClr val="lt1"/>
+          </a:fontRef>
+        </p:style>
+        <p:txBody>
+          <a:bodyPr rtlCol="0" anchor="ctr"/>
+          <a:lstStyle/>
+          <a:p>
+            <a:pPr algn="ctr"/>
+            <a:endParaRPr lang="en-SG"/>
+          </a:p>
+        </p:txBody>
+      </p:sp>
+      <p:sp>
+        <p:nvSpPr>
+          <p:cNvPr id="62" name="TextBox 61">
+            <a:extLst>
+              <a:ext uri="{FF2B5EF4-FFF2-40B4-BE49-F238E27FC236}">
+                <a16:creationId xmlns:a16="http://schemas.microsoft.com/office/drawing/2014/main" id="{D7EDCE94-CB52-7E4E-9F7B-09618674F44D}"/>
+              </a:ext>
+            </a:extLst>
+          </p:cNvPr>
+          <p:cNvSpPr txBox="1"/>
+          <p:nvPr/>
+        </p:nvSpPr>
+        <p:spPr>
+          <a:xfrm>
+            <a:off x="1643150" y="2954822"/>
+            <a:ext cx="1640785" cy="246221"/>
+          </a:xfrm>
+          <a:prstGeom prst="rect">
+            <a:avLst/>
+          </a:prstGeom>
+          <a:noFill/>
+        </p:spPr>
+        <p:txBody>
+          <a:bodyPr wrap="square" rtlCol="0">
+            <a:spAutoFit/>
+          </a:bodyPr>
+          <a:lstStyle/>
+          <a:p>
+            <a:pPr algn="r"/>
+            <a:r>
+              <a:rPr lang="en-US" sz="1000" dirty="0">
+                <a:solidFill>
+                  <a:schemeClr val="accent1"/>
+                </a:solidFill>
+              </a:rPr>
+              <a:t>Merge</a:t>
+            </a:r>
+            <a:r>
+              <a:rPr lang="zh-CN" altLang="en-US" sz="1000" dirty="0">
+                <a:solidFill>
+                  <a:schemeClr val="accent1"/>
+                </a:solidFill>
+              </a:rPr>
+              <a:t> </a:t>
+            </a:r>
+            <a:r>
+              <a:rPr lang="en-US" altLang="zh-CN" sz="1000" dirty="0">
+                <a:solidFill>
+                  <a:schemeClr val="accent1"/>
+                </a:solidFill>
+              </a:rPr>
+              <a:t>group</a:t>
+            </a:r>
+            <a:endParaRPr lang="en-SG" sz="1000" dirty="0">
+              <a:solidFill>
+                <a:schemeClr val="accent1"/>
+              </a:solidFill>
+            </a:endParaRPr>
+          </a:p>
+        </p:txBody>
+      </p:sp>
     </p:spTree>
     <p:extLst>
       <p:ext uri="{BB962C8B-B14F-4D97-AF65-F5344CB8AC3E}">

</xml_diff>